<commit_message>
the second ppt half done
</commit_message>
<xml_diff>
--- a/bacchus presentation-logic model.pptx
+++ b/bacchus presentation-logic model.pptx
@@ -372,7 +372,7 @@
             <a:fld id="{A8ADFD5B-A66C-449C-B6E8-FB716D07777D}" type="datetimeFigureOut">
               <a:rPr lang="en-US" smtClean="0"/>
               <a:pPr/>
-              <a:t>3/23/2015</a:t>
+              <a:t>3/24/2015</a:t>
             </a:fld>
             <a:endParaRPr lang="en-US"/>
           </a:p>
@@ -1091,7 +1091,7 @@
                 </a:solidFill>
               </a:rPr>
               <a:pPr algn="ctr"/>
-              <a:t>3/23/2015</a:t>
+              <a:t>3/24/2015</a:t>
             </a:fld>
             <a:endParaRPr lang="en-US" sz="2000" dirty="0">
               <a:solidFill>
@@ -1288,7 +1288,7 @@
             <a:fld id="{E4606EA6-EFEA-4C30-9264-4F9291A5780D}" type="datetime1">
               <a:rPr lang="en-US" smtClean="0"/>
               <a:pPr/>
-              <a:t>3/23/2015</a:t>
+              <a:t>3/24/2015</a:t>
             </a:fld>
             <a:endParaRPr lang="en-US"/>
           </a:p>
@@ -1719,7 +1719,7 @@
             <a:fld id="{6FCF9F07-3BC7-4570-B054-79111B0A380C}" type="datetime1">
               <a:rPr lang="en-US" smtClean="0"/>
               <a:pPr/>
-              <a:t>3/23/2015</a:t>
+              <a:t>3/24/2015</a:t>
             </a:fld>
             <a:endParaRPr lang="en-US"/>
           </a:p>
@@ -1983,7 +1983,7 @@
             <a:fld id="{E4606EA6-EFEA-4C30-9264-4F9291A5780D}" type="datetime1">
               <a:rPr lang="en-US" smtClean="0"/>
               <a:pPr/>
-              <a:t>3/23/2015</a:t>
+              <a:t>3/24/2015</a:t>
             </a:fld>
             <a:endParaRPr lang="en-US"/>
           </a:p>
@@ -2237,7 +2237,7 @@
             <a:fld id="{E4606EA6-EFEA-4C30-9264-4F9291A5780D}" type="datetime1">
               <a:rPr lang="en-US" smtClean="0"/>
               <a:pPr/>
-              <a:t>3/23/2015</a:t>
+              <a:t>3/24/2015</a:t>
             </a:fld>
             <a:endParaRPr lang="en-US"/>
           </a:p>
@@ -2449,7 +2449,7 @@
             <a:fld id="{6DFADB5D-B7A0-47E3-AD2D-B1A6F8614213}" type="datetime1">
               <a:rPr lang="en-US" smtClean="0"/>
               <a:pPr/>
-              <a:t>3/23/2015</a:t>
+              <a:t>3/24/2015</a:t>
             </a:fld>
             <a:endParaRPr lang="en-US"/>
           </a:p>
@@ -2562,7 +2562,7 @@
             <a:fld id="{72968126-03FC-49C0-B9B8-2B561CCC3D90}" type="datetime1">
               <a:rPr lang="en-US" smtClean="0"/>
               <a:pPr/>
-              <a:t>3/23/2015</a:t>
+              <a:t>3/24/2015</a:t>
             </a:fld>
             <a:endParaRPr lang="en-US"/>
           </a:p>
@@ -2714,7 +2714,7 @@
             <a:fld id="{F49A8198-4617-485E-9585-4840B69DBBA6}" type="datetime1">
               <a:rPr lang="en-US" smtClean="0"/>
               <a:pPr/>
-              <a:t>3/23/2015</a:t>
+              <a:t>3/24/2015</a:t>
             </a:fld>
             <a:endParaRPr lang="en-US"/>
           </a:p>
@@ -3302,7 +3302,7 @@
             <a:fld id="{E4606EA6-EFEA-4C30-9264-4F9291A5780D}" type="datetime1">
               <a:rPr lang="en-US" smtClean="0"/>
               <a:pPr/>
-              <a:t>3/23/2015</a:t>
+              <a:t>3/24/2015</a:t>
             </a:fld>
             <a:endParaRPr lang="en-US"/>
           </a:p>
@@ -3502,7 +3502,7 @@
             <a:fld id="{E4606EA6-EFEA-4C30-9264-4F9291A5780D}" type="datetime1">
               <a:rPr lang="en-US" smtClean="0"/>
               <a:pPr/>
-              <a:t>3/23/2015</a:t>
+              <a:t>3/24/2015</a:t>
             </a:fld>
             <a:endParaRPr lang="en-US" sz="1400" dirty="0">
               <a:solidFill>
@@ -4145,41 +4145,6 @@
           </a:extLst>
         </p:spPr>
       </p:pic>
-      <p:sp>
-        <p:nvSpPr>
-          <p:cNvPr id="8" name="TextBox 7"/>
-          <p:cNvSpPr txBox="1"/>
-          <p:nvPr/>
-        </p:nvSpPr>
-        <p:spPr>
-          <a:xfrm>
-            <a:off x="952499" y="3728637"/>
-            <a:ext cx="7086600" cy="369332"/>
-          </a:xfrm>
-          <a:prstGeom prst="rect">
-            <a:avLst/>
-          </a:prstGeom>
-          <a:noFill/>
-        </p:spPr>
-        <p:txBody>
-          <a:bodyPr wrap="square" rtlCol="0">
-            <a:spAutoFit/>
-          </a:bodyPr>
-          <a:lstStyle/>
-          <a:p>
-            <a:pPr algn="ctr"/>
-            <a:r>
-              <a:rPr lang="en-US" i="1" dirty="0" smtClean="0">
-                <a:latin typeface="Century Gothic" panose="020B0502020202020204" pitchFamily="34" charset="0"/>
-              </a:rPr>
-              <a:t>“insert a motivational quotes that can be use as our tagline”</a:t>
-            </a:r>
-            <a:endParaRPr lang="en-US" i="1" dirty="0">
-              <a:latin typeface="Century Gothic" panose="020B0502020202020204" pitchFamily="34" charset="0"/>
-            </a:endParaRPr>
-          </a:p>
-        </p:txBody>
-      </p:sp>
       <p:grpSp>
         <p:nvGrpSpPr>
           <p:cNvPr id="10" name="Group 9"/>
@@ -4457,50 +4422,6 @@
                             </p:childTnLst>
                           </p:cTn>
                         </p:par>
-                        <p:par>
-                          <p:cTn id="10" fill="hold">
-                            <p:stCondLst>
-                              <p:cond delay="1000"/>
-                            </p:stCondLst>
-                            <p:childTnLst>
-                              <p:par>
-                                <p:cTn id="11" presetID="14" presetClass="entr" presetSubtype="10" fill="hold" grpId="0" nodeType="afterEffect">
-                                  <p:stCondLst>
-                                    <p:cond delay="0"/>
-                                  </p:stCondLst>
-                                  <p:childTnLst>
-                                    <p:set>
-                                      <p:cBhvr>
-                                        <p:cTn id="12" dur="1" fill="hold">
-                                          <p:stCondLst>
-                                            <p:cond delay="0"/>
-                                          </p:stCondLst>
-                                        </p:cTn>
-                                        <p:tgtEl>
-                                          <p:spTgt spid="8"/>
-                                        </p:tgtEl>
-                                        <p:attrNameLst>
-                                          <p:attrName>style.visibility</p:attrName>
-                                        </p:attrNameLst>
-                                      </p:cBhvr>
-                                      <p:to>
-                                        <p:strVal val="visible"/>
-                                      </p:to>
-                                    </p:set>
-                                    <p:animEffect transition="in" filter="randombar(horizontal)">
-                                      <p:cBhvr>
-                                        <p:cTn id="13" dur="500"/>
-                                        <p:tgtEl>
-                                          <p:spTgt spid="8"/>
-                                        </p:tgtEl>
-                                      </p:cBhvr>
-                                    </p:animEffect>
-                                  </p:childTnLst>
-                                </p:cTn>
-                              </p:par>
-                            </p:childTnLst>
-                          </p:cTn>
-                        </p:par>
                       </p:childTnLst>
                     </p:cTn>
                   </p:par>
@@ -4525,9 +4446,6 @@
         </p:cTn>
       </p:par>
     </p:tnLst>
-    <p:bldLst>
-      <p:bldP spid="8" grpId="0"/>
-    </p:bldLst>
   </p:timing>
 </p:sld>
 </file>

</xml_diff>